<commit_message>
add all including report
</commit_message>
<xml_diff>
--- a/report/BTech_Project.pptx
+++ b/report/BTech_Project.pptx
@@ -5,7 +5,7 @@
     <p:sldMasterId id="2147483994" r:id="rId1"/>
   </p:sldMasterIdLst>
   <p:notesMasterIdLst>
-    <p:notesMasterId r:id="rId29"/>
+    <p:notesMasterId r:id="rId33"/>
   </p:notesMasterIdLst>
   <p:sldIdLst>
     <p:sldId id="256" r:id="rId2"/>
@@ -29,12 +29,16 @@
     <p:sldId id="266" r:id="rId20"/>
     <p:sldId id="265" r:id="rId21"/>
     <p:sldId id="283" r:id="rId22"/>
-    <p:sldId id="267" r:id="rId23"/>
-    <p:sldId id="284" r:id="rId24"/>
-    <p:sldId id="268" r:id="rId25"/>
-    <p:sldId id="269" r:id="rId26"/>
-    <p:sldId id="270" r:id="rId27"/>
-    <p:sldId id="271" r:id="rId28"/>
+    <p:sldId id="288" r:id="rId23"/>
+    <p:sldId id="267" r:id="rId24"/>
+    <p:sldId id="284" r:id="rId25"/>
+    <p:sldId id="286" r:id="rId26"/>
+    <p:sldId id="268" r:id="rId27"/>
+    <p:sldId id="269" r:id="rId28"/>
+    <p:sldId id="287" r:id="rId29"/>
+    <p:sldId id="270" r:id="rId30"/>
+    <p:sldId id="271" r:id="rId31"/>
+    <p:sldId id="289" r:id="rId32"/>
   </p:sldIdLst>
   <p:sldSz cx="9144000" cy="6858000" type="screen4x3"/>
   <p:notesSz cx="6858000" cy="9144000"/>
@@ -1191,6 +1195,13 @@
         </dgm:presLayoutVars>
       </dgm:prSet>
       <dgm:spPr/>
+      <dgm:t>
+        <a:bodyPr/>
+        <a:lstStyle/>
+        <a:p>
+          <a:endParaRPr lang="en-US"/>
+        </a:p>
+      </dgm:t>
     </dgm:pt>
     <dgm:pt modelId="{85CB27F7-B9AF-0C44-B067-60762F7C33EC}" type="pres">
       <dgm:prSet presAssocID="{AFAA86B5-07BE-FD42-9B58-0D17E91BD3A4}" presName="hierRoot1" presStyleCnt="0">
@@ -1222,6 +1233,13 @@
     <dgm:pt modelId="{5D4FDEAF-09E1-E949-9FB5-8658F642B7F8}" type="pres">
       <dgm:prSet presAssocID="{AFAA86B5-07BE-FD42-9B58-0D17E91BD3A4}" presName="rootConnector1" presStyleLbl="node1" presStyleIdx="0" presStyleCnt="0"/>
       <dgm:spPr/>
+      <dgm:t>
+        <a:bodyPr/>
+        <a:lstStyle/>
+        <a:p>
+          <a:endParaRPr lang="en-US"/>
+        </a:p>
+      </dgm:t>
     </dgm:pt>
     <dgm:pt modelId="{B2CB1E3A-203C-3D46-A01F-78A0F3CE5BC6}" type="pres">
       <dgm:prSet presAssocID="{AFAA86B5-07BE-FD42-9B58-0D17E91BD3A4}" presName="hierChild2" presStyleCnt="0"/>
@@ -1230,6 +1248,13 @@
     <dgm:pt modelId="{4385FC99-A4A4-AF40-8C23-83C507B87AC8}" type="pres">
       <dgm:prSet presAssocID="{EBBE0B54-CA93-C04F-952E-FC5973E3C20C}" presName="Name37" presStyleLbl="parChTrans1D2" presStyleIdx="0" presStyleCnt="3"/>
       <dgm:spPr/>
+      <dgm:t>
+        <a:bodyPr/>
+        <a:lstStyle/>
+        <a:p>
+          <a:endParaRPr lang="en-US"/>
+        </a:p>
+      </dgm:t>
     </dgm:pt>
     <dgm:pt modelId="{4843AEF8-32E9-224B-8EE5-1CF85BF9AFDE}" type="pres">
       <dgm:prSet presAssocID="{07E31BC7-A612-1644-BC09-1159E7D5170F}" presName="hierRoot2" presStyleCnt="0">
@@ -1261,6 +1286,13 @@
     <dgm:pt modelId="{AE6E951F-9685-7346-9544-937527DFF3A7}" type="pres">
       <dgm:prSet presAssocID="{07E31BC7-A612-1644-BC09-1159E7D5170F}" presName="rootConnector" presStyleLbl="node2" presStyleIdx="0" presStyleCnt="1"/>
       <dgm:spPr/>
+      <dgm:t>
+        <a:bodyPr/>
+        <a:lstStyle/>
+        <a:p>
+          <a:endParaRPr lang="en-US"/>
+        </a:p>
+      </dgm:t>
     </dgm:pt>
     <dgm:pt modelId="{719107B3-69E9-DD4B-A389-1B68A8465F27}" type="pres">
       <dgm:prSet presAssocID="{07E31BC7-A612-1644-BC09-1159E7D5170F}" presName="hierChild4" presStyleCnt="0"/>
@@ -1269,6 +1301,13 @@
     <dgm:pt modelId="{D5389523-AD12-684E-A58E-DF3AA2BDC9A8}" type="pres">
       <dgm:prSet presAssocID="{16ED7744-851D-EF40-9235-5C84E79D30A4}" presName="Name37" presStyleLbl="parChTrans1D3" presStyleIdx="0" presStyleCnt="1"/>
       <dgm:spPr/>
+      <dgm:t>
+        <a:bodyPr/>
+        <a:lstStyle/>
+        <a:p>
+          <a:endParaRPr lang="en-US"/>
+        </a:p>
+      </dgm:t>
     </dgm:pt>
     <dgm:pt modelId="{74A62BD7-6EC0-E44B-BC4D-BD0B0E1A6291}" type="pres">
       <dgm:prSet presAssocID="{B51A5FA6-52DD-B94C-8C36-67459E61C57A}" presName="hierRoot2" presStyleCnt="0">
@@ -1300,6 +1339,13 @@
     <dgm:pt modelId="{33EC5406-43E3-334F-A7FC-514A843C8114}" type="pres">
       <dgm:prSet presAssocID="{B51A5FA6-52DD-B94C-8C36-67459E61C57A}" presName="rootConnector" presStyleLbl="node3" presStyleIdx="0" presStyleCnt="1"/>
       <dgm:spPr/>
+      <dgm:t>
+        <a:bodyPr/>
+        <a:lstStyle/>
+        <a:p>
+          <a:endParaRPr lang="en-US"/>
+        </a:p>
+      </dgm:t>
     </dgm:pt>
     <dgm:pt modelId="{CEC8325C-C550-614E-9801-008BDA5F6B05}" type="pres">
       <dgm:prSet presAssocID="{B51A5FA6-52DD-B94C-8C36-67459E61C57A}" presName="hierChild4" presStyleCnt="0"/>
@@ -1308,6 +1354,13 @@
     <dgm:pt modelId="{2D4EB56F-50E9-3A49-B28A-87712D258C12}" type="pres">
       <dgm:prSet presAssocID="{625F6E4D-2B55-D542-AF4E-D39953B61904}" presName="Name37" presStyleLbl="parChTrans1D4" presStyleIdx="0" presStyleCnt="1"/>
       <dgm:spPr/>
+      <dgm:t>
+        <a:bodyPr/>
+        <a:lstStyle/>
+        <a:p>
+          <a:endParaRPr lang="en-US"/>
+        </a:p>
+      </dgm:t>
     </dgm:pt>
     <dgm:pt modelId="{CBC82F67-3EF9-0044-B65C-97C9E166BF53}" type="pres">
       <dgm:prSet presAssocID="{1EA79C30-ADA8-A949-AFB4-068BBAF2CCD2}" presName="hierRoot2" presStyleCnt="0">
@@ -1339,6 +1392,13 @@
     <dgm:pt modelId="{E21C0CC8-D062-4344-9B00-CA89FB01731E}" type="pres">
       <dgm:prSet presAssocID="{1EA79C30-ADA8-A949-AFB4-068BBAF2CCD2}" presName="rootConnector" presStyleLbl="node4" presStyleIdx="0" presStyleCnt="1"/>
       <dgm:spPr/>
+      <dgm:t>
+        <a:bodyPr/>
+        <a:lstStyle/>
+        <a:p>
+          <a:endParaRPr lang="en-US"/>
+        </a:p>
+      </dgm:t>
     </dgm:pt>
     <dgm:pt modelId="{D9244793-72E0-3440-B0DB-6B58802E334A}" type="pres">
       <dgm:prSet presAssocID="{1EA79C30-ADA8-A949-AFB4-068BBAF2CCD2}" presName="hierChild4" presStyleCnt="0"/>
@@ -1363,6 +1423,13 @@
     <dgm:pt modelId="{C1125402-FC73-0F4B-BA5A-FC3B05613560}" type="pres">
       <dgm:prSet presAssocID="{CDEA6D38-D087-B14D-9BA4-6063AD08F72F}" presName="Name111" presStyleLbl="parChTrans1D2" presStyleIdx="1" presStyleCnt="3"/>
       <dgm:spPr/>
+      <dgm:t>
+        <a:bodyPr/>
+        <a:lstStyle/>
+        <a:p>
+          <a:endParaRPr lang="en-US"/>
+        </a:p>
+      </dgm:t>
     </dgm:pt>
     <dgm:pt modelId="{8444B4F2-88F0-4F42-8931-E65E0E903011}" type="pres">
       <dgm:prSet presAssocID="{BADB99A1-42F1-8F4D-B250-B806F20F0D6E}" presName="hierRoot3" presStyleCnt="0">
@@ -1394,6 +1461,13 @@
     <dgm:pt modelId="{14109BFF-9188-CE40-9A70-657109D9F9B3}" type="pres">
       <dgm:prSet presAssocID="{BADB99A1-42F1-8F4D-B250-B806F20F0D6E}" presName="rootConnector3" presStyleLbl="asst1" presStyleIdx="0" presStyleCnt="2"/>
       <dgm:spPr/>
+      <dgm:t>
+        <a:bodyPr/>
+        <a:lstStyle/>
+        <a:p>
+          <a:endParaRPr lang="en-US"/>
+        </a:p>
+      </dgm:t>
     </dgm:pt>
     <dgm:pt modelId="{B8B7F298-DDAD-8348-96A7-0FBBFEB8206B}" type="pres">
       <dgm:prSet presAssocID="{BADB99A1-42F1-8F4D-B250-B806F20F0D6E}" presName="hierChild6" presStyleCnt="0"/>
@@ -1406,6 +1480,13 @@
     <dgm:pt modelId="{29EFF799-AE90-6041-8062-30BDF646205B}" type="pres">
       <dgm:prSet presAssocID="{2FCCAF7A-34F8-2C41-BE2B-8A48E27CF770}" presName="Name111" presStyleLbl="parChTrans1D2" presStyleIdx="2" presStyleCnt="3"/>
       <dgm:spPr/>
+      <dgm:t>
+        <a:bodyPr/>
+        <a:lstStyle/>
+        <a:p>
+          <a:endParaRPr lang="en-US"/>
+        </a:p>
+      </dgm:t>
     </dgm:pt>
     <dgm:pt modelId="{B7348768-4AB6-E847-AAC9-2E4729A866E6}" type="pres">
       <dgm:prSet presAssocID="{DC29BF00-5734-EC48-AD45-0F2286D33973}" presName="hierRoot3" presStyleCnt="0">
@@ -1426,10 +1507,24 @@
         </dgm:presLayoutVars>
       </dgm:prSet>
       <dgm:spPr/>
+      <dgm:t>
+        <a:bodyPr/>
+        <a:lstStyle/>
+        <a:p>
+          <a:endParaRPr lang="en-US"/>
+        </a:p>
+      </dgm:t>
     </dgm:pt>
     <dgm:pt modelId="{6F651483-D072-2F44-8BEB-3CA5FD3E5658}" type="pres">
       <dgm:prSet presAssocID="{DC29BF00-5734-EC48-AD45-0F2286D33973}" presName="rootConnector3" presStyleLbl="asst1" presStyleIdx="1" presStyleCnt="2"/>
       <dgm:spPr/>
+      <dgm:t>
+        <a:bodyPr/>
+        <a:lstStyle/>
+        <a:p>
+          <a:endParaRPr lang="en-US"/>
+        </a:p>
+      </dgm:t>
     </dgm:pt>
     <dgm:pt modelId="{C69A4F08-7E37-8348-8258-B76BF2ED0C96}" type="pres">
       <dgm:prSet presAssocID="{DC29BF00-5734-EC48-AD45-0F2286D33973}" presName="hierChild6" presStyleCnt="0"/>
@@ -4543,7 +4638,7 @@
           <a:p>
             <a:fld id="{E56BF8E6-A2DC-8549-AD92-56DC3AE68C22}" type="datetimeFigureOut">
               <a:rPr lang="en-US" smtClean="0"/>
-              <a:t>30/04/13</a:t>
+              <a:t>02/05/13</a:t>
             </a:fld>
             <a:endParaRPr lang="en-US"/>
           </a:p>
@@ -5009,11 +5104,7 @@
             </a:pPr>
             <a:r>
               <a:rPr lang="en-US" dirty="0" smtClean="0"/>
-              <a:t>Example : </a:t>
-            </a:r>
-            <a:r>
-              <a:rPr lang="en-US" dirty="0" smtClean="0"/>
-              <a:t>An example of an association rule would be "If a customer buys a dozen eggs, he is 80% likely to also purchase milk.”</a:t>
+              <a:t>Example : An example of an association rule would be "If a customer buys a dozen eggs, he is 80% likely to also purchase milk.”</a:t>
             </a:r>
           </a:p>
           <a:p>
@@ -5063,11 +5154,11 @@
               <a:t> is an indication of how frequently the items appear in the database. </a:t>
             </a:r>
             <a:r>
-              <a:rPr lang="en-US" i="1" smtClean="0"/>
+              <a:rPr lang="en-US" i="1" dirty="0" smtClean="0"/>
               <a:t>Confidence</a:t>
             </a:r>
             <a:r>
-              <a:rPr lang="en-US" smtClean="0"/>
+              <a:rPr lang="en-US" dirty="0" smtClean="0"/>
               <a:t> indicates the number of times the if/then statements have been found to be true.</a:t>
             </a:r>
           </a:p>
@@ -5089,7 +5180,7 @@
               <a:tabLst/>
               <a:defRPr/>
             </a:pPr>
-            <a:endParaRPr lang="en-US" smtClean="0"/>
+            <a:endParaRPr lang="en-US" dirty="0" smtClean="0"/>
           </a:p>
           <a:p>
             <a:endParaRPr lang="en-US" dirty="0"/>
@@ -5113,7 +5204,7 @@
           <a:p>
             <a:fld id="{F3F84F0C-DC98-9346-9129-4522E0C4852F}" type="slidenum">
               <a:rPr lang="en-US" smtClean="0"/>
-              <a:t>24</a:t>
+              <a:t>26</a:t>
             </a:fld>
             <a:endParaRPr lang="en-US"/>
           </a:p>
@@ -5274,11 +5365,7 @@
             </a:r>
             <a:r>
               <a:rPr lang="en-US" baseline="0" dirty="0" smtClean="0"/>
-              <a:t> are managed by the cloud management </a:t>
-            </a:r>
-            <a:r>
-              <a:rPr lang="en-US" baseline="0" dirty="0" smtClean="0"/>
-              <a:t>server.</a:t>
+              <a:t> are managed by the cloud management server.</a:t>
             </a:r>
           </a:p>
           <a:p>
@@ -5810,7 +5897,6 @@
               <a:rPr lang="en-US" dirty="0" smtClean="0"/>
               <a:t>What is blue gene</a:t>
             </a:r>
-            <a:endParaRPr lang="en-US" dirty="0" smtClean="0"/>
           </a:p>
           <a:p>
             <a:r>
@@ -6346,7 +6432,7 @@
           <a:p>
             <a:fld id="{679BC7E7-EA8E-4DA7-915E-CC098D9BADCB}" type="datetimeFigureOut">
               <a:rPr lang="en-US" smtClean="0"/>
-              <a:t>30/04/13</a:t>
+              <a:t>02/05/13</a:t>
             </a:fld>
             <a:endParaRPr lang="en-US"/>
           </a:p>
@@ -6437,7 +6523,7 @@
           <a:p>
             <a:fld id="{679BC7E7-EA8E-4DA7-915E-CC098D9BADCB}" type="datetimeFigureOut">
               <a:rPr lang="en-US" smtClean="0"/>
-              <a:t>30/04/13</a:t>
+              <a:t>02/05/13</a:t>
             </a:fld>
             <a:endParaRPr lang="en-US"/>
           </a:p>
@@ -6740,7 +6826,7 @@
           <a:p>
             <a:fld id="{679BC7E7-EA8E-4DA7-915E-CC098D9BADCB}" type="datetimeFigureOut">
               <a:rPr lang="en-US" smtClean="0"/>
-              <a:t>30/04/13</a:t>
+              <a:t>02/05/13</a:t>
             </a:fld>
             <a:endParaRPr lang="en-US"/>
           </a:p>
@@ -6962,7 +7048,7 @@
           <a:p>
             <a:fld id="{679BC7E7-EA8E-4DA7-915E-CC098D9BADCB}" type="datetimeFigureOut">
               <a:rPr lang="en-US" smtClean="0"/>
-              <a:t>30/04/13</a:t>
+              <a:t>02/05/13</a:t>
             </a:fld>
             <a:endParaRPr lang="en-US"/>
           </a:p>
@@ -7350,7 +7436,7 @@
           <a:p>
             <a:fld id="{679BC7E7-EA8E-4DA7-915E-CC098D9BADCB}" type="datetimeFigureOut">
               <a:rPr lang="en-US" smtClean="0"/>
-              <a:t>30/04/13</a:t>
+              <a:t>02/05/13</a:t>
             </a:fld>
             <a:endParaRPr lang="en-US"/>
           </a:p>
@@ -7658,7 +7744,7 @@
           <a:p>
             <a:fld id="{679BC7E7-EA8E-4DA7-915E-CC098D9BADCB}" type="datetimeFigureOut">
               <a:rPr lang="en-US" smtClean="0"/>
-              <a:t>30/04/13</a:t>
+              <a:t>02/05/13</a:t>
             </a:fld>
             <a:endParaRPr lang="en-US"/>
           </a:p>
@@ -7856,7 +7942,7 @@
           <a:p>
             <a:fld id="{679BC7E7-EA8E-4DA7-915E-CC098D9BADCB}" type="datetimeFigureOut">
               <a:rPr lang="en-US" smtClean="0"/>
-              <a:t>30/04/13</a:t>
+              <a:t>02/05/13</a:t>
             </a:fld>
             <a:endParaRPr lang="en-US"/>
           </a:p>
@@ -8059,7 +8145,7 @@
           <a:p>
             <a:fld id="{679BC7E7-EA8E-4DA7-915E-CC098D9BADCB}" type="datetimeFigureOut">
               <a:rPr lang="en-US" smtClean="0"/>
-              <a:t>30/04/13</a:t>
+              <a:t>02/05/13</a:t>
             </a:fld>
             <a:endParaRPr lang="en-US"/>
           </a:p>
@@ -8252,7 +8338,7 @@
           <a:p>
             <a:fld id="{679BC7E7-EA8E-4DA7-915E-CC098D9BADCB}" type="datetimeFigureOut">
               <a:rPr lang="en-US" smtClean="0"/>
-              <a:t>30/04/13</a:t>
+              <a:t>02/05/13</a:t>
             </a:fld>
             <a:endParaRPr lang="en-US"/>
           </a:p>
@@ -8524,7 +8610,7 @@
           <a:p>
             <a:fld id="{679BC7E7-EA8E-4DA7-915E-CC098D9BADCB}" type="datetimeFigureOut">
               <a:rPr lang="en-US" smtClean="0"/>
-              <a:t>30/04/13</a:t>
+              <a:t>02/05/13</a:t>
             </a:fld>
             <a:endParaRPr lang="en-US"/>
           </a:p>
@@ -8835,7 +8921,7 @@
           <a:p>
             <a:fld id="{679BC7E7-EA8E-4DA7-915E-CC098D9BADCB}" type="datetimeFigureOut">
               <a:rPr lang="en-US" smtClean="0"/>
-              <a:t>30/04/13</a:t>
+              <a:t>02/05/13</a:t>
             </a:fld>
             <a:endParaRPr lang="en-US"/>
           </a:p>
@@ -9301,7 +9387,7 @@
           <a:p>
             <a:fld id="{679BC7E7-EA8E-4DA7-915E-CC098D9BADCB}" type="datetimeFigureOut">
               <a:rPr lang="en-US" smtClean="0"/>
-              <a:t>30/04/13</a:t>
+              <a:t>02/05/13</a:t>
             </a:fld>
             <a:endParaRPr lang="en-US"/>
           </a:p>
@@ -9665,7 +9751,7 @@
           <a:p>
             <a:fld id="{679BC7E7-EA8E-4DA7-915E-CC098D9BADCB}" type="datetimeFigureOut">
               <a:rPr lang="en-US" smtClean="0"/>
-              <a:t>30/04/13</a:t>
+              <a:t>02/05/13</a:t>
             </a:fld>
             <a:endParaRPr lang="en-US"/>
           </a:p>
@@ -9976,7 +10062,7 @@
           <a:p>
             <a:fld id="{679BC7E7-EA8E-4DA7-915E-CC098D9BADCB}" type="datetimeFigureOut">
               <a:rPr lang="en-US" smtClean="0"/>
-              <a:t>30/04/13</a:t>
+              <a:t>02/05/13</a:t>
             </a:fld>
             <a:endParaRPr lang="en-US"/>
           </a:p>
@@ -10287,7 +10373,7 @@
           <a:p>
             <a:fld id="{679BC7E7-EA8E-4DA7-915E-CC098D9BADCB}" type="datetimeFigureOut">
               <a:rPr lang="en-US" smtClean="0"/>
-              <a:t>30/04/13</a:t>
+              <a:t>02/05/13</a:t>
             </a:fld>
             <a:endParaRPr lang="en-US"/>
           </a:p>
@@ -10772,7 +10858,7 @@
           <a:p>
             <a:fld id="{679BC7E7-EA8E-4DA7-915E-CC098D9BADCB}" type="datetimeFigureOut">
               <a:rPr lang="en-US" smtClean="0"/>
-              <a:t>30/04/13</a:t>
+              <a:t>02/05/13</a:t>
             </a:fld>
             <a:endParaRPr lang="en-US"/>
           </a:p>
@@ -11035,7 +11121,7 @@
           <a:p>
             <a:fld id="{679BC7E7-EA8E-4DA7-915E-CC098D9BADCB}" type="datetimeFigureOut">
               <a:rPr lang="en-US" smtClean="0"/>
-              <a:t>30/04/13</a:t>
+              <a:t>02/05/13</a:t>
             </a:fld>
             <a:endParaRPr lang="en-US"/>
           </a:p>
@@ -16346,7 +16432,6 @@
               <a:rPr lang="en-US" dirty="0"/>
               <a:t>a unified view of the entire computing environment </a:t>
             </a:r>
-            <a:endParaRPr lang="en-US" dirty="0"/>
           </a:p>
           <a:p>
             <a:r>
@@ -17526,13 +17611,8 @@
           <a:p>
             <a:r>
               <a:rPr lang="en-US" dirty="0" smtClean="0"/>
-              <a:t>Error messages originally </a:t>
-            </a:r>
-            <a:r>
-              <a:rPr lang="en-US" dirty="0" smtClean="0"/>
-              <a:t>very elaborate</a:t>
-            </a:r>
-            <a:endParaRPr lang="en-US" dirty="0" smtClean="0"/>
+              <a:t>Error messages originally very elaborate</a:t>
+            </a:r>
           </a:p>
           <a:p>
             <a:r>
@@ -17644,7 +17724,23 @@
           <a:bodyPr/>
           <a:lstStyle/>
           <a:p>
-            <a:endParaRPr lang="en-US"/>
+            <a:r>
+              <a:rPr lang="en-US" dirty="0" smtClean="0"/>
+              <a:t>No. of distinct entries (many of which may be logically similar) : 329482</a:t>
+            </a:r>
+          </a:p>
+          <a:p>
+            <a:r>
+              <a:rPr lang="en-US" dirty="0" smtClean="0"/>
+              <a:t>No. of truly distinct entries after scrubbing : 101</a:t>
+            </a:r>
+          </a:p>
+          <a:p>
+            <a:r>
+              <a:rPr lang="en-US" dirty="0" smtClean="0"/>
+              <a:t>Percentage reduction in types of error messages : 99.97%</a:t>
+            </a:r>
+            <a:endParaRPr lang="en-US" dirty="0"/>
           </a:p>
         </p:txBody>
       </p:sp>
@@ -17702,77 +17798,410 @@
           <a:p>
             <a:r>
               <a:rPr lang="en-US" dirty="0" smtClean="0"/>
-              <a:t>Filtering</a:t>
+              <a:t>Scrubbing</a:t>
             </a:r>
             <a:endParaRPr lang="en-US" dirty="0"/>
           </a:p>
         </p:txBody>
       </p:sp>
-      <p:sp>
-        <p:nvSpPr>
-          <p:cNvPr id="3" name="Content Placeholder 2"/>
-          <p:cNvSpPr>
-            <a:spLocks noGrp="1"/>
-          </p:cNvSpPr>
+      <p:graphicFrame>
+        <p:nvGraphicFramePr>
+          <p:cNvPr id="9" name="Content Placeholder 8"/>
+          <p:cNvGraphicFramePr>
+            <a:graphicFrameLocks noGrp="1"/>
+          </p:cNvGraphicFramePr>
           <p:nvPr>
             <p:ph idx="1"/>
+            <p:extLst>
+              <p:ext uri="{D42A27DB-BD31-4B8C-83A1-F6EECF244321}">
+                <p14:modId xmlns:p14="http://schemas.microsoft.com/office/powerpoint/2010/main" val="2943711953"/>
+              </p:ext>
+            </p:extLst>
           </p:nvPr>
-        </p:nvSpPr>
-        <p:spPr/>
-        <p:txBody>
-          <a:bodyPr/>
-          <a:lstStyle/>
-          <a:p>
-            <a:r>
-              <a:rPr lang="en-US" dirty="0" smtClean="0"/>
-              <a:t>Log reporting at microsecond frequency</a:t>
-            </a:r>
-          </a:p>
-          <a:p>
-            <a:r>
-              <a:rPr lang="en-US" dirty="0" smtClean="0"/>
-              <a:t>Same error reported multiple times</a:t>
-            </a:r>
-          </a:p>
-          <a:p>
-            <a:r>
-              <a:rPr lang="en-US" dirty="0" smtClean="0"/>
-              <a:t>Temporal filtering at the same location by removing similar entries within a time window</a:t>
-            </a:r>
-          </a:p>
-          <a:p>
-            <a:r>
-              <a:rPr lang="en-US" dirty="0" smtClean="0"/>
-              <a:t>Significant reduction in the log size</a:t>
-            </a:r>
-          </a:p>
-        </p:txBody>
-      </p:sp>
+        </p:nvGraphicFramePr>
+        <p:xfrm>
+          <a:off x="779462" y="1817957"/>
+          <a:ext cx="7583488" cy="4079240"/>
+        </p:xfrm>
+        <a:graphic>
+          <a:graphicData uri="http://schemas.openxmlformats.org/drawingml/2006/table">
+            <a:tbl>
+              <a:tblPr firstRow="1" bandRow="1">
+                <a:tableStyleId>{5C22544A-7EE6-4342-B048-85BDC9FD1C3A}</a:tableStyleId>
+              </a:tblPr>
+              <a:tblGrid>
+                <a:gridCol w="3791744"/>
+                <a:gridCol w="3791744"/>
+              </a:tblGrid>
+              <a:tr h="370840">
+                <a:tc>
+                  <a:txBody>
+                    <a:bodyPr/>
+                    <a:lstStyle/>
+                    <a:p>
+                      <a:pPr algn="ctr"/>
+                      <a:r>
+                        <a:rPr lang="en-US" dirty="0" smtClean="0"/>
+                        <a:t>Facility</a:t>
+                      </a:r>
+                      <a:endParaRPr lang="en-US" dirty="0"/>
+                    </a:p>
+                  </a:txBody>
+                  <a:tcPr/>
+                </a:tc>
+                <a:tc>
+                  <a:txBody>
+                    <a:bodyPr/>
+                    <a:lstStyle/>
+                    <a:p>
+                      <a:pPr algn="ctr"/>
+                      <a:r>
+                        <a:rPr lang="en-US" dirty="0" smtClean="0"/>
+                        <a:t>Number of types of</a:t>
+                      </a:r>
+                      <a:r>
+                        <a:rPr lang="en-US" baseline="0" dirty="0" smtClean="0"/>
+                        <a:t> failures</a:t>
+                      </a:r>
+                      <a:endParaRPr lang="en-US" dirty="0"/>
+                    </a:p>
+                  </a:txBody>
+                  <a:tcPr/>
+                </a:tc>
+              </a:tr>
+              <a:tr h="370840">
+                <a:tc>
+                  <a:txBody>
+                    <a:bodyPr/>
+                    <a:lstStyle/>
+                    <a:p>
+                      <a:pPr algn="ctr"/>
+                      <a:r>
+                        <a:rPr lang="en-US" dirty="0" smtClean="0"/>
+                        <a:t>APP	</a:t>
+                      </a:r>
+                    </a:p>
+                  </a:txBody>
+                  <a:tcPr/>
+                </a:tc>
+                <a:tc>
+                  <a:txBody>
+                    <a:bodyPr/>
+                    <a:lstStyle/>
+                    <a:p>
+                      <a:pPr algn="ctr"/>
+                      <a:r>
+                        <a:rPr lang="en-US" dirty="0" smtClean="0"/>
+                        <a:t>6</a:t>
+                      </a:r>
+                      <a:endParaRPr lang="en-US" dirty="0"/>
+                    </a:p>
+                  </a:txBody>
+                  <a:tcPr/>
+                </a:tc>
+              </a:tr>
+              <a:tr h="370840">
+                <a:tc>
+                  <a:txBody>
+                    <a:bodyPr/>
+                    <a:lstStyle/>
+                    <a:p>
+                      <a:pPr algn="ctr"/>
+                      <a:r>
+                        <a:rPr lang="en-US" dirty="0" smtClean="0"/>
+                        <a:t>BGLMASTER</a:t>
+                      </a:r>
+                      <a:endParaRPr lang="en-US" dirty="0"/>
+                    </a:p>
+                  </a:txBody>
+                  <a:tcPr/>
+                </a:tc>
+                <a:tc>
+                  <a:txBody>
+                    <a:bodyPr/>
+                    <a:lstStyle/>
+                    <a:p>
+                      <a:pPr algn="ctr"/>
+                      <a:r>
+                        <a:rPr lang="en-US" dirty="0" smtClean="0"/>
+                        <a:t>4</a:t>
+                      </a:r>
+                      <a:endParaRPr lang="en-US" dirty="0"/>
+                    </a:p>
+                  </a:txBody>
+                  <a:tcPr/>
+                </a:tc>
+              </a:tr>
+              <a:tr h="370840">
+                <a:tc>
+                  <a:txBody>
+                    <a:bodyPr/>
+                    <a:lstStyle/>
+                    <a:p>
+                      <a:pPr algn="ctr"/>
+                      <a:r>
+                        <a:rPr lang="en-US" dirty="0" smtClean="0"/>
+                        <a:t>CMCS</a:t>
+                      </a:r>
+                      <a:endParaRPr lang="en-US" dirty="0"/>
+                    </a:p>
+                  </a:txBody>
+                  <a:tcPr/>
+                </a:tc>
+                <a:tc>
+                  <a:txBody>
+                    <a:bodyPr/>
+                    <a:lstStyle/>
+                    <a:p>
+                      <a:pPr algn="ctr"/>
+                      <a:r>
+                        <a:rPr lang="en-US" dirty="0" smtClean="0"/>
+                        <a:t>2</a:t>
+                      </a:r>
+                      <a:endParaRPr lang="en-US" dirty="0"/>
+                    </a:p>
+                  </a:txBody>
+                  <a:tcPr/>
+                </a:tc>
+              </a:tr>
+              <a:tr h="370840">
+                <a:tc>
+                  <a:txBody>
+                    <a:bodyPr/>
+                    <a:lstStyle/>
+                    <a:p>
+                      <a:pPr algn="ctr"/>
+                      <a:r>
+                        <a:rPr lang="en-US" dirty="0" smtClean="0"/>
+                        <a:t>DISCOVERY</a:t>
+                      </a:r>
+                      <a:endParaRPr lang="en-US" dirty="0"/>
+                    </a:p>
+                  </a:txBody>
+                  <a:tcPr/>
+                </a:tc>
+                <a:tc>
+                  <a:txBody>
+                    <a:bodyPr/>
+                    <a:lstStyle/>
+                    <a:p>
+                      <a:pPr algn="ctr"/>
+                      <a:r>
+                        <a:rPr lang="en-US" dirty="0" smtClean="0"/>
+                        <a:t>11</a:t>
+                      </a:r>
+                      <a:endParaRPr lang="en-US" dirty="0"/>
+                    </a:p>
+                  </a:txBody>
+                  <a:tcPr/>
+                </a:tc>
+              </a:tr>
+              <a:tr h="370840">
+                <a:tc>
+                  <a:txBody>
+                    <a:bodyPr/>
+                    <a:lstStyle/>
+                    <a:p>
+                      <a:pPr algn="ctr"/>
+                      <a:r>
+                        <a:rPr lang="en-US" dirty="0" smtClean="0"/>
+                        <a:t>HARDWARE</a:t>
+                      </a:r>
+                      <a:endParaRPr lang="en-US" dirty="0"/>
+                    </a:p>
+                  </a:txBody>
+                  <a:tcPr/>
+                </a:tc>
+                <a:tc>
+                  <a:txBody>
+                    <a:bodyPr/>
+                    <a:lstStyle/>
+                    <a:p>
+                      <a:pPr algn="ctr"/>
+                      <a:r>
+                        <a:rPr lang="en-US" dirty="0" smtClean="0"/>
+                        <a:t>6</a:t>
+                      </a:r>
+                      <a:endParaRPr lang="en-US" dirty="0"/>
+                    </a:p>
+                  </a:txBody>
+                  <a:tcPr/>
+                </a:tc>
+              </a:tr>
+              <a:tr h="370840">
+                <a:tc>
+                  <a:txBody>
+                    <a:bodyPr/>
+                    <a:lstStyle/>
+                    <a:p>
+                      <a:pPr algn="ctr"/>
+                      <a:r>
+                        <a:rPr lang="en-US" dirty="0" smtClean="0"/>
+                        <a:t>KERNEL</a:t>
+                      </a:r>
+                      <a:endParaRPr lang="en-US" dirty="0"/>
+                    </a:p>
+                  </a:txBody>
+                  <a:tcPr/>
+                </a:tc>
+                <a:tc>
+                  <a:txBody>
+                    <a:bodyPr/>
+                    <a:lstStyle/>
+                    <a:p>
+                      <a:pPr algn="ctr"/>
+                      <a:r>
+                        <a:rPr lang="en-US" dirty="0" smtClean="0"/>
+                        <a:t>71</a:t>
+                      </a:r>
+                      <a:endParaRPr lang="en-US" dirty="0"/>
+                    </a:p>
+                  </a:txBody>
+                  <a:tcPr/>
+                </a:tc>
+              </a:tr>
+              <a:tr h="370840">
+                <a:tc>
+                  <a:txBody>
+                    <a:bodyPr/>
+                    <a:lstStyle/>
+                    <a:p>
+                      <a:pPr algn="ctr"/>
+                      <a:r>
+                        <a:rPr lang="en-US" dirty="0" smtClean="0"/>
+                        <a:t>LINKCARD</a:t>
+                      </a:r>
+                      <a:endParaRPr lang="en-US" dirty="0"/>
+                    </a:p>
+                  </a:txBody>
+                  <a:tcPr/>
+                </a:tc>
+                <a:tc>
+                  <a:txBody>
+                    <a:bodyPr/>
+                    <a:lstStyle/>
+                    <a:p>
+                      <a:pPr algn="ctr"/>
+                      <a:r>
+                        <a:rPr lang="en-US" dirty="0" smtClean="0"/>
+                        <a:t>2</a:t>
+                      </a:r>
+                      <a:endParaRPr lang="en-US" dirty="0"/>
+                    </a:p>
+                  </a:txBody>
+                  <a:tcPr/>
+                </a:tc>
+              </a:tr>
+              <a:tr h="370840">
+                <a:tc>
+                  <a:txBody>
+                    <a:bodyPr/>
+                    <a:lstStyle/>
+                    <a:p>
+                      <a:pPr algn="ctr"/>
+                      <a:r>
+                        <a:rPr lang="en-US" dirty="0" smtClean="0"/>
+                        <a:t>MMCS</a:t>
+                      </a:r>
+                      <a:endParaRPr lang="en-US" dirty="0"/>
+                    </a:p>
+                  </a:txBody>
+                  <a:tcPr/>
+                </a:tc>
+                <a:tc>
+                  <a:txBody>
+                    <a:bodyPr/>
+                    <a:lstStyle/>
+                    <a:p>
+                      <a:pPr algn="ctr"/>
+                      <a:r>
+                        <a:rPr lang="en-US" dirty="0" smtClean="0"/>
+                        <a:t>6</a:t>
+                      </a:r>
+                      <a:endParaRPr lang="en-US" dirty="0"/>
+                    </a:p>
+                  </a:txBody>
+                  <a:tcPr/>
+                </a:tc>
+              </a:tr>
+              <a:tr h="370840">
+                <a:tc>
+                  <a:txBody>
+                    <a:bodyPr/>
+                    <a:lstStyle/>
+                    <a:p>
+                      <a:pPr algn="ctr"/>
+                      <a:r>
+                        <a:rPr lang="en-US" dirty="0" smtClean="0"/>
+                        <a:t>MONITOR</a:t>
+                      </a:r>
+                      <a:endParaRPr lang="en-US" dirty="0"/>
+                    </a:p>
+                  </a:txBody>
+                  <a:tcPr/>
+                </a:tc>
+                <a:tc>
+                  <a:txBody>
+                    <a:bodyPr/>
+                    <a:lstStyle/>
+                    <a:p>
+                      <a:pPr algn="ctr"/>
+                      <a:r>
+                        <a:rPr lang="en-US" dirty="0" smtClean="0"/>
+                        <a:t>5</a:t>
+                      </a:r>
+                      <a:endParaRPr lang="en-US" dirty="0"/>
+                    </a:p>
+                  </a:txBody>
+                  <a:tcPr/>
+                </a:tc>
+              </a:tr>
+              <a:tr h="370840">
+                <a:tc>
+                  <a:txBody>
+                    <a:bodyPr/>
+                    <a:lstStyle/>
+                    <a:p>
+                      <a:pPr algn="ctr"/>
+                      <a:r>
+                        <a:rPr lang="en-US" dirty="0" smtClean="0"/>
+                        <a:t>SERV_NET</a:t>
+                      </a:r>
+                      <a:endParaRPr lang="en-US" dirty="0"/>
+                    </a:p>
+                  </a:txBody>
+                  <a:tcPr/>
+                </a:tc>
+                <a:tc>
+                  <a:txBody>
+                    <a:bodyPr/>
+                    <a:lstStyle/>
+                    <a:p>
+                      <a:pPr algn="ctr"/>
+                      <a:r>
+                        <a:rPr lang="en-US" dirty="0" smtClean="0"/>
+                        <a:t>2</a:t>
+                      </a:r>
+                      <a:endParaRPr lang="en-US" dirty="0"/>
+                    </a:p>
+                  </a:txBody>
+                  <a:tcPr/>
+                </a:tc>
+              </a:tr>
+            </a:tbl>
+          </a:graphicData>
+        </a:graphic>
+      </p:graphicFrame>
     </p:spTree>
     <p:extLst>
       <p:ext uri="{BB962C8B-B14F-4D97-AF65-F5344CB8AC3E}">
-        <p14:creationId xmlns:p14="http://schemas.microsoft.com/office/powerpoint/2010/main" val="193925610"/>
+        <p14:creationId xmlns:p14="http://schemas.microsoft.com/office/powerpoint/2010/main" val="3631195830"/>
       </p:ext>
     </p:extLst>
   </p:cSld>
   <p:clrMapOvr>
     <a:masterClrMapping/>
   </p:clrMapOvr>
-  <mc:AlternateContent xmlns:mc="http://schemas.openxmlformats.org/markup-compatibility/2006" xmlns:p14="http://schemas.microsoft.com/office/powerpoint/2010/main">
-    <mc:Choice Requires="p14">
-      <p:transition spd="slow" p14:dur="2000"/>
-    </mc:Choice>
-    <mc:Fallback xmlns="">
-      <p:transition xmlns:p14="http://schemas.microsoft.com/office/powerpoint/2010/main" spd="slow"/>
-    </mc:Fallback>
-  </mc:AlternateContent>
-  <p:timing>
-    <p:tnLst>
-      <p:par>
-        <p:cTn xmlns:p14="http://schemas.microsoft.com/office/powerpoint/2010/main" id="1" dur="indefinite" restart="never" nodeType="tmRoot"/>
-      </p:par>
-    </p:tnLst>
-  </p:timing>
 </p:sld>
 </file>
 
@@ -17831,31 +18260,49 @@
           <a:bodyPr/>
           <a:lstStyle/>
           <a:p>
-            <a:pPr marL="282575" lvl="1" indent="-282575">
-              <a:spcBef>
-                <a:spcPts val="2000"/>
-              </a:spcBef>
-            </a:pPr>
-            <a:r>
-              <a:rPr lang="en-US" dirty="0"/>
-              <a:t>&lt;WRITE STATS HERE&gt;</a:t>
-            </a:r>
-          </a:p>
-          <a:p>
-            <a:endParaRPr lang="en-US" dirty="0"/>
+            <a:r>
+              <a:rPr lang="en-US" dirty="0" smtClean="0"/>
+              <a:t>Log reporting at microsecond frequency</a:t>
+            </a:r>
+          </a:p>
+          <a:p>
+            <a:r>
+              <a:rPr lang="en-US" dirty="0" smtClean="0"/>
+              <a:t>Same error reported multiple times</a:t>
+            </a:r>
+          </a:p>
+          <a:p>
+            <a:r>
+              <a:rPr lang="en-US" dirty="0" smtClean="0"/>
+              <a:t>Temporal filtering at the same location by removing similar entries within a time window</a:t>
+            </a:r>
+          </a:p>
+          <a:p>
+            <a:r>
+              <a:rPr lang="en-US" dirty="0" smtClean="0"/>
+              <a:t>Significant reduction in the log size</a:t>
+            </a:r>
           </a:p>
         </p:txBody>
       </p:sp>
     </p:spTree>
     <p:extLst>
       <p:ext uri="{BB962C8B-B14F-4D97-AF65-F5344CB8AC3E}">
-        <p14:creationId xmlns:p14="http://schemas.microsoft.com/office/powerpoint/2010/main" val="3551145533"/>
+        <p14:creationId xmlns:p14="http://schemas.microsoft.com/office/powerpoint/2010/main" val="193925610"/>
       </p:ext>
     </p:extLst>
   </p:cSld>
   <p:clrMapOvr>
     <a:masterClrMapping/>
   </p:clrMapOvr>
+  <mc:AlternateContent xmlns:mc="http://schemas.openxmlformats.org/markup-compatibility/2006" xmlns:p14="http://schemas.microsoft.com/office/powerpoint/2010/main">
+    <mc:Choice Requires="p14">
+      <p:transition spd="slow" p14:dur="2000"/>
+    </mc:Choice>
+    <mc:Fallback xmlns="">
+      <p:transition xmlns:p14="http://schemas.microsoft.com/office/powerpoint/2010/main" spd="slow"/>
+    </mc:Fallback>
+  </mc:AlternateContent>
   <p:timing>
     <p:tnLst>
       <p:par>
@@ -17900,7 +18347,7 @@
           <a:p>
             <a:r>
               <a:rPr lang="en-US" dirty="0" smtClean="0"/>
-              <a:t>Association Rules, why</a:t>
+              <a:t>Filtering</a:t>
             </a:r>
             <a:endParaRPr lang="en-US" dirty="0"/>
           </a:p>
@@ -17916,89 +18363,70 @@
             <p:ph idx="1"/>
           </p:nvPr>
         </p:nvSpPr>
-        <p:spPr/>
+        <p:spPr>
+          <a:xfrm>
+            <a:off x="779463" y="1858532"/>
+            <a:ext cx="7583487" cy="4208930"/>
+          </a:xfrm>
+        </p:spPr>
         <p:txBody>
           <a:bodyPr/>
           <a:lstStyle/>
           <a:p>
+            <a:pPr marL="282575" lvl="1" indent="-282575">
+              <a:spcBef>
+                <a:spcPts val="2000"/>
+              </a:spcBef>
+            </a:pPr>
+            <a:r>
+              <a:rPr lang="en-US" dirty="0" smtClean="0"/>
+              <a:t>Number of entries before filtering : </a:t>
+            </a:r>
             <a:r>
               <a:rPr lang="en-US" dirty="0"/>
-              <a:t>Association rules are if/then statements that help uncover relationships between seemingly unrelated data in a </a:t>
-            </a:r>
-            <a:r>
-              <a:rPr lang="en-US" dirty="0">
-                <a:hlinkClick r:id="rId3"/>
-              </a:rPr>
-              <a:t>relational database</a:t>
+              <a:t>4747963</a:t>
+            </a:r>
+            <a:endParaRPr lang="en-US" dirty="0" smtClean="0"/>
+          </a:p>
+          <a:p>
+            <a:pPr marL="282575" lvl="1" indent="-282575">
+              <a:spcBef>
+                <a:spcPts val="2000"/>
+              </a:spcBef>
+            </a:pPr>
+            <a:r>
+              <a:rPr lang="en-US" dirty="0" smtClean="0"/>
+              <a:t>Number of entries after filtering </a:t>
             </a:r>
             <a:r>
               <a:rPr lang="en-US" dirty="0"/>
-              <a:t> or other information repository</a:t>
-            </a:r>
+              <a:t>: 2832849</a:t>
+            </a:r>
+            <a:endParaRPr lang="en-US" dirty="0" smtClean="0"/>
+          </a:p>
+          <a:p>
+            <a:pPr marL="282575" lvl="1" indent="-282575">
+              <a:spcBef>
+                <a:spcPts val="2000"/>
+              </a:spcBef>
+            </a:pPr>
             <a:r>
               <a:rPr lang="en-US" dirty="0" smtClean="0"/>
-              <a:t>.</a:t>
-            </a:r>
-          </a:p>
-          <a:p>
-            <a:r>
-              <a:rPr lang="en-US" dirty="0"/>
-              <a:t>Association rules are created by </a:t>
-            </a:r>
-            <a:r>
-              <a:rPr lang="en-US" dirty="0" smtClean="0"/>
-              <a:t>using </a:t>
-            </a:r>
-            <a:r>
-              <a:rPr lang="en-US" dirty="0"/>
-              <a:t>the criteria </a:t>
-            </a:r>
-            <a:r>
-              <a:rPr lang="en-US" i="1" dirty="0"/>
-              <a:t>support</a:t>
-            </a:r>
-            <a:r>
-              <a:rPr lang="en-US" dirty="0"/>
-              <a:t> and </a:t>
-            </a:r>
-            <a:r>
-              <a:rPr lang="en-US" i="1" dirty="0"/>
-              <a:t>confidence</a:t>
-            </a:r>
-            <a:r>
-              <a:rPr lang="en-US" dirty="0"/>
-              <a:t> to identify the most important relationships</a:t>
-            </a:r>
-            <a:r>
-              <a:rPr lang="en-US" i="1" dirty="0"/>
-              <a:t>.</a:t>
-            </a:r>
-            <a:r>
-              <a:rPr lang="en-US" dirty="0"/>
-              <a:t> </a:t>
-            </a:r>
-            <a:endParaRPr lang="en-US" dirty="0"/>
+              <a:t>Percentage reduction in number of entries : 40.34 %</a:t>
+            </a:r>
           </a:p>
         </p:txBody>
       </p:sp>
     </p:spTree>
     <p:extLst>
       <p:ext uri="{BB962C8B-B14F-4D97-AF65-F5344CB8AC3E}">
-        <p14:creationId xmlns:p14="http://schemas.microsoft.com/office/powerpoint/2010/main" val="1294875744"/>
+        <p14:creationId xmlns:p14="http://schemas.microsoft.com/office/powerpoint/2010/main" val="3551145533"/>
       </p:ext>
     </p:extLst>
   </p:cSld>
   <p:clrMapOvr>
     <a:masterClrMapping/>
   </p:clrMapOvr>
-  <mc:AlternateContent xmlns:mc="http://schemas.openxmlformats.org/markup-compatibility/2006" xmlns:p14="http://schemas.microsoft.com/office/powerpoint/2010/main">
-    <mc:Choice Requires="p14">
-      <p:transition spd="slow" p14:dur="2000"/>
-    </mc:Choice>
-    <mc:Fallback xmlns="">
-      <p:transition xmlns:p14="http://schemas.microsoft.com/office/powerpoint/2010/main" spd="slow"/>
-    </mc:Fallback>
-  </mc:AlternateContent>
   <p:timing>
     <p:tnLst>
       <p:par>
@@ -18043,49 +18471,52 @@
           <a:p>
             <a:r>
               <a:rPr lang="en-US" dirty="0" smtClean="0"/>
-              <a:t>The predictor</a:t>
+              <a:t>Failure Prediction Scheme</a:t>
             </a:r>
             <a:endParaRPr lang="en-US" dirty="0"/>
           </a:p>
         </p:txBody>
       </p:sp>
-      <p:sp>
-        <p:nvSpPr>
-          <p:cNvPr id="3" name="Content Placeholder 2"/>
-          <p:cNvSpPr>
-            <a:spLocks noGrp="1"/>
-          </p:cNvSpPr>
+      <p:pic>
+        <p:nvPicPr>
+          <p:cNvPr id="5" name="Content Placeholder 4" descr="failure_prediction_scheme.png"/>
+          <p:cNvPicPr>
+            <a:picLocks noGrp="1" noChangeAspect="1"/>
+          </p:cNvPicPr>
           <p:nvPr>
             <p:ph idx="1"/>
           </p:nvPr>
-        </p:nvSpPr>
-        <p:spPr/>
-        <p:txBody>
-          <a:bodyPr/>
-          <a:lstStyle/>
-          <a:p>
-            <a:endParaRPr lang="en-US"/>
-          </a:p>
-        </p:txBody>
-      </p:sp>
+        </p:nvPicPr>
+        <p:blipFill>
+          <a:blip r:embed="rId2">
+            <a:extLst>
+              <a:ext uri="{28A0092B-C50C-407E-A947-70E740481C1C}">
+                <a14:useLocalDpi xmlns:a14="http://schemas.microsoft.com/office/drawing/2010/main" val="0"/>
+              </a:ext>
+            </a:extLst>
+          </a:blip>
+          <a:srcRect l="-87057" r="-87057"/>
+          <a:stretch>
+            <a:fillRect/>
+          </a:stretch>
+        </p:blipFill>
+        <p:spPr>
+          <a:xfrm>
+            <a:off x="0" y="1546334"/>
+            <a:ext cx="8962674" cy="4974396"/>
+          </a:xfrm>
+        </p:spPr>
+      </p:pic>
     </p:spTree>
     <p:extLst>
       <p:ext uri="{BB962C8B-B14F-4D97-AF65-F5344CB8AC3E}">
-        <p14:creationId xmlns:p14="http://schemas.microsoft.com/office/powerpoint/2010/main" val="3226966630"/>
+        <p14:creationId xmlns:p14="http://schemas.microsoft.com/office/powerpoint/2010/main" val="4021090717"/>
       </p:ext>
     </p:extLst>
   </p:cSld>
   <p:clrMapOvr>
     <a:masterClrMapping/>
   </p:clrMapOvr>
-  <mc:AlternateContent xmlns:mc="http://schemas.openxmlformats.org/markup-compatibility/2006" xmlns:p14="http://schemas.microsoft.com/office/powerpoint/2010/main">
-    <mc:Choice Requires="p14">
-      <p:transition spd="slow" p14:dur="2000"/>
-    </mc:Choice>
-    <mc:Fallback xmlns="">
-      <p:transition xmlns:p14="http://schemas.microsoft.com/office/powerpoint/2010/main" spd="slow"/>
-    </mc:Fallback>
-  </mc:AlternateContent>
   <p:timing>
     <p:tnLst>
       <p:par>
@@ -18130,9 +18561,21 @@
           <a:p>
             <a:r>
               <a:rPr lang="en-US" dirty="0" smtClean="0"/>
-              <a:t>Evaluation metrics</a:t>
-            </a:r>
-            <a:endParaRPr lang="en-US" dirty="0"/>
+              <a:t>Association Rules</a:t>
+            </a:r>
+            <a:r>
+              <a:rPr lang="en-US" dirty="0"/>
+              <a:t> </a:t>
+            </a:r>
+            <a:r>
+              <a:rPr lang="en-US" dirty="0" smtClean="0"/>
+              <a:t>– Why</a:t>
+            </a:r>
+            <a:r>
+              <a:rPr lang="en-US" baseline="30000" dirty="0" smtClean="0"/>
+              <a:t>[7]</a:t>
+            </a:r>
+            <a:endParaRPr lang="en-US" baseline="30000" dirty="0"/>
           </a:p>
         </p:txBody>
       </p:sp>
@@ -18151,14 +18594,147 @@
           <a:bodyPr/>
           <a:lstStyle/>
           <a:p>
-            <a:endParaRPr lang="en-US"/>
+            <a:r>
+              <a:rPr lang="en-US" dirty="0"/>
+              <a:t>H</a:t>
+            </a:r>
+            <a:r>
+              <a:rPr lang="en-US" dirty="0" smtClean="0"/>
+              <a:t>igh confidence</a:t>
+            </a:r>
+          </a:p>
+          <a:p>
+            <a:r>
+              <a:rPr lang="en-US" dirty="0"/>
+              <a:t>I</a:t>
+            </a:r>
+            <a:r>
+              <a:rPr lang="en-US" dirty="0" smtClean="0"/>
+              <a:t>nvolve </a:t>
+            </a:r>
+            <a:r>
+              <a:rPr lang="en-US" dirty="0"/>
+              <a:t>larger subsets of the data </a:t>
+            </a:r>
+            <a:r>
+              <a:rPr lang="en-US" dirty="0" smtClean="0"/>
+              <a:t>set</a:t>
+            </a:r>
+          </a:p>
+          <a:p>
+            <a:r>
+              <a:rPr lang="en-US" dirty="0"/>
+              <a:t>B</a:t>
+            </a:r>
+            <a:r>
+              <a:rPr lang="en-US" dirty="0" smtClean="0"/>
+              <a:t>etter </a:t>
+            </a:r>
+            <a:r>
+              <a:rPr lang="en-US" dirty="0"/>
+              <a:t>for multiple target </a:t>
+            </a:r>
+            <a:r>
+              <a:rPr lang="en-US" dirty="0" smtClean="0"/>
+              <a:t>attributes</a:t>
+            </a:r>
+          </a:p>
+          <a:p>
+            <a:r>
+              <a:rPr lang="en-US" dirty="0" smtClean="0"/>
+              <a:t>They </a:t>
+            </a:r>
+            <a:r>
+              <a:rPr lang="en-US" dirty="0"/>
+              <a:t>are easier to </a:t>
+            </a:r>
+            <a:r>
+              <a:rPr lang="en-US" dirty="0" smtClean="0"/>
+              <a:t>interpret</a:t>
+            </a:r>
+          </a:p>
+          <a:p>
+            <a:r>
+              <a:rPr lang="en-US" dirty="0" err="1" smtClean="0"/>
+              <a:t>Eg</a:t>
+            </a:r>
+            <a:r>
+              <a:rPr lang="en-US" dirty="0" smtClean="0"/>
+              <a:t>. </a:t>
+            </a:r>
+          </a:p>
+          <a:p>
+            <a:pPr lvl="1"/>
+            <a:r>
+              <a:rPr lang="fi-FI" dirty="0" err="1" smtClean="0"/>
+              <a:t>nodeError</a:t>
+            </a:r>
+            <a:r>
+              <a:rPr lang="fi-FI" dirty="0" err="1"/>
+              <a:t>=true</a:t>
+            </a:r>
+            <a:r>
+              <a:rPr lang="fi-FI" dirty="0"/>
+              <a:t> </a:t>
+            </a:r>
+            <a:r>
+              <a:rPr lang="fi-FI" dirty="0" err="1"/>
+              <a:t>linkCardFailure=</a:t>
+            </a:r>
+            <a:r>
+              <a:rPr lang="fi-FI" dirty="0" err="1" smtClean="0"/>
+              <a:t>true</a:t>
+            </a:r>
+            <a:r>
+              <a:rPr lang="fi-FI" dirty="0" smtClean="0"/>
+              <a:t> </a:t>
+            </a:r>
+            <a:r>
+              <a:rPr lang="fi-FI" dirty="0"/>
+              <a:t>==&gt; </a:t>
+            </a:r>
+            <a:r>
+              <a:rPr lang="fi-FI" dirty="0" err="1"/>
+              <a:t>nodeFailure=</a:t>
+            </a:r>
+            <a:r>
+              <a:rPr lang="fi-FI" dirty="0" err="1" smtClean="0"/>
+              <a:t>true</a:t>
+            </a:r>
+            <a:r>
+              <a:rPr lang="fi-FI" dirty="0" smtClean="0"/>
+              <a:t>    &lt;</a:t>
+            </a:r>
+            <a:r>
+              <a:rPr lang="fi-FI" dirty="0" err="1" smtClean="0"/>
+              <a:t>conf</a:t>
+            </a:r>
+            <a:r>
+              <a:rPr lang="fi-FI" dirty="0" smtClean="0"/>
+              <a:t>:</a:t>
+            </a:r>
+            <a:r>
+              <a:rPr lang="en-US" dirty="0" smtClean="0">
+                <a:sym typeface="Wingdings"/>
+              </a:rPr>
+              <a:t> (0.93</a:t>
+            </a:r>
+            <a:r>
+              <a:rPr lang="fi-FI" dirty="0" smtClean="0"/>
+              <a:t>)</a:t>
+            </a:r>
+            <a:r>
+              <a:rPr lang="fi-FI" dirty="0"/>
+              <a:t>&gt;</a:t>
+            </a:r>
+            <a:endParaRPr lang="en-US" dirty="0"/>
           </a:p>
         </p:txBody>
       </p:sp>
     </p:spTree>
     <p:extLst>
       <p:ext uri="{BB962C8B-B14F-4D97-AF65-F5344CB8AC3E}">
-        <p14:creationId xmlns:p14="http://schemas.microsoft.com/office/powerpoint/2010/main" val="2042949283"/>
+        <p14:creationId xmlns:p14="http://schemas.microsoft.com/office/powerpoint/2010/main" val="1294875744"/>
       </p:ext>
     </p:extLst>
   </p:cSld>
@@ -18217,7 +18793,7 @@
           <a:p>
             <a:r>
               <a:rPr lang="en-US" dirty="0" smtClean="0"/>
-              <a:t>Results</a:t>
+              <a:t>The Predictor</a:t>
             </a:r>
             <a:endParaRPr lang="en-US" dirty="0"/>
           </a:p>
@@ -18235,17 +18811,157 @@
         </p:nvSpPr>
         <p:spPr/>
         <p:txBody>
-          <a:bodyPr/>
+          <a:bodyPr>
+            <a:normAutofit lnSpcReduction="10000"/>
+          </a:bodyPr>
           <a:lstStyle/>
           <a:p>
+            <a:r>
+              <a:rPr lang="en-US" dirty="0" smtClean="0"/>
+              <a:t>Triggered failures list(TF List) – Failures triggered by an event</a:t>
+            </a:r>
+          </a:p>
+          <a:p>
+            <a:r>
+              <a:rPr lang="en-US" dirty="0" smtClean="0"/>
+              <a:t>Triggering events list(TE List) – Events triggering a failure</a:t>
+            </a:r>
+          </a:p>
+          <a:p>
+            <a:r>
+              <a:rPr lang="fi-FI" dirty="0" err="1"/>
+              <a:t>nodeError=true</a:t>
+            </a:r>
+            <a:r>
+              <a:rPr lang="fi-FI" dirty="0"/>
+              <a:t> </a:t>
+            </a:r>
+            <a:r>
+              <a:rPr lang="fi-FI" dirty="0" err="1"/>
+              <a:t>linkCardFailure=true</a:t>
+            </a:r>
+            <a:r>
+              <a:rPr lang="fi-FI" dirty="0"/>
+              <a:t> </a:t>
+            </a:r>
+            <a:r>
+              <a:rPr lang="fi-FI" dirty="0" smtClean="0"/>
+              <a:t>==</a:t>
+            </a:r>
+            <a:r>
+              <a:rPr lang="fi-FI" dirty="0"/>
+              <a:t>&gt; </a:t>
+            </a:r>
+            <a:r>
+              <a:rPr lang="fi-FI" dirty="0" err="1"/>
+              <a:t>nodeFailure=</a:t>
+            </a:r>
+            <a:r>
+              <a:rPr lang="fi-FI" dirty="0" err="1" smtClean="0"/>
+              <a:t>true</a:t>
+            </a:r>
+            <a:endParaRPr lang="fi-FI" dirty="0" smtClean="0"/>
+          </a:p>
+          <a:p>
+            <a:pPr lvl="1"/>
+            <a:r>
+              <a:rPr lang="fi-FI" dirty="0" smtClean="0"/>
+              <a:t>TF </a:t>
+            </a:r>
+            <a:r>
+              <a:rPr lang="fi-FI" dirty="0" err="1" smtClean="0"/>
+              <a:t>list</a:t>
+            </a:r>
+            <a:r>
+              <a:rPr lang="fi-FI" dirty="0" smtClean="0"/>
+              <a:t>:</a:t>
+            </a:r>
+          </a:p>
+          <a:p>
+            <a:pPr lvl="2"/>
+            <a:r>
+              <a:rPr lang="fi-FI" dirty="0" err="1" smtClean="0"/>
+              <a:t>nodeError</a:t>
+            </a:r>
+            <a:r>
+              <a:rPr lang="fi-FI" dirty="0" smtClean="0"/>
+              <a:t> </a:t>
+            </a:r>
+            <a:r>
+              <a:rPr lang="en-US" dirty="0" smtClean="0"/>
+              <a:t>–</a:t>
+            </a:r>
+            <a:r>
+              <a:rPr lang="fi-FI" dirty="0" smtClean="0"/>
+              <a:t> </a:t>
+            </a:r>
+            <a:r>
+              <a:rPr lang="fi-FI" dirty="0" err="1" smtClean="0"/>
+              <a:t>nodeFailure</a:t>
+            </a:r>
+            <a:endParaRPr lang="fi-FI" dirty="0" smtClean="0"/>
+          </a:p>
+          <a:p>
+            <a:pPr lvl="2"/>
+            <a:r>
+              <a:rPr lang="fi-FI" dirty="0" err="1" smtClean="0"/>
+              <a:t>linkCardFailure</a:t>
+            </a:r>
+            <a:r>
+              <a:rPr lang="fi-FI" dirty="0" smtClean="0"/>
+              <a:t> </a:t>
+            </a:r>
+            <a:r>
+              <a:rPr lang="en-US" dirty="0" smtClean="0"/>
+              <a:t>–</a:t>
+            </a:r>
+            <a:r>
+              <a:rPr lang="fi-FI" dirty="0" smtClean="0"/>
+              <a:t> </a:t>
+            </a:r>
+            <a:r>
+              <a:rPr lang="fi-FI" dirty="0" err="1" smtClean="0"/>
+              <a:t>nodeFailure</a:t>
+            </a:r>
             <a:endParaRPr lang="en-US" dirty="0"/>
+          </a:p>
+          <a:p>
+            <a:pPr lvl="1"/>
+            <a:r>
+              <a:rPr lang="en-US" dirty="0" smtClean="0"/>
+              <a:t>TE list:</a:t>
+            </a:r>
+          </a:p>
+          <a:p>
+            <a:pPr lvl="2"/>
+            <a:r>
+              <a:rPr lang="en-US" dirty="0" err="1" smtClean="0"/>
+              <a:t>nodeFailure</a:t>
+            </a:r>
+            <a:r>
+              <a:rPr lang="en-US" dirty="0" smtClean="0"/>
+              <a:t> – </a:t>
+            </a:r>
+            <a:r>
+              <a:rPr lang="en-US" dirty="0" err="1" smtClean="0"/>
+              <a:t>nodeError</a:t>
+            </a:r>
+            <a:r>
+              <a:rPr lang="en-US" dirty="0" smtClean="0"/>
+              <a:t>, </a:t>
+            </a:r>
+            <a:r>
+              <a:rPr lang="en-US" dirty="0" err="1" smtClean="0"/>
+              <a:t>linkCardFailure</a:t>
+            </a:r>
+            <a:endParaRPr lang="fi-FI" dirty="0" smtClean="0"/>
           </a:p>
         </p:txBody>
       </p:sp>
     </p:spTree>
     <p:extLst>
       <p:ext uri="{BB962C8B-B14F-4D97-AF65-F5344CB8AC3E}">
-        <p14:creationId xmlns:p14="http://schemas.microsoft.com/office/powerpoint/2010/main" val="1358400907"/>
+        <p14:creationId xmlns:p14="http://schemas.microsoft.com/office/powerpoint/2010/main" val="3226966630"/>
       </p:ext>
     </p:extLst>
   </p:cSld>
@@ -18260,6 +18976,265 @@
       <p:transition xmlns:p14="http://schemas.microsoft.com/office/powerpoint/2010/main" spd="slow"/>
     </mc:Fallback>
   </mc:AlternateContent>
+  <p:timing>
+    <p:tnLst>
+      <p:par>
+        <p:cTn xmlns:p14="http://schemas.microsoft.com/office/powerpoint/2010/main" id="1" dur="indefinite" restart="never" nodeType="tmRoot"/>
+      </p:par>
+    </p:tnLst>
+  </p:timing>
+</p:sld>
+</file>
+
+<file path=ppt/slides/slide28.xml><?xml version="1.0" encoding="utf-8"?>
+<p:sld xmlns:a="http://schemas.openxmlformats.org/drawingml/2006/main" xmlns:r="http://schemas.openxmlformats.org/officeDocument/2006/relationships" xmlns:p="http://schemas.openxmlformats.org/presentationml/2006/main">
+  <p:cSld>
+    <p:spTree>
+      <p:nvGrpSpPr>
+        <p:cNvPr id="1" name=""/>
+        <p:cNvGrpSpPr/>
+        <p:nvPr/>
+      </p:nvGrpSpPr>
+      <p:grpSpPr>
+        <a:xfrm>
+          <a:off x="0" y="0"/>
+          <a:ext cx="0" cy="0"/>
+          <a:chOff x="0" y="0"/>
+          <a:chExt cx="0" cy="0"/>
+        </a:xfrm>
+      </p:grpSpPr>
+      <p:sp>
+        <p:nvSpPr>
+          <p:cNvPr id="2" name="Title 1"/>
+          <p:cNvSpPr>
+            <a:spLocks noGrp="1"/>
+          </p:cNvSpPr>
+          <p:nvPr>
+            <p:ph type="title"/>
+          </p:nvPr>
+        </p:nvSpPr>
+        <p:spPr/>
+        <p:txBody>
+          <a:bodyPr/>
+          <a:lstStyle/>
+          <a:p>
+            <a:r>
+              <a:rPr lang="en-US" dirty="0" smtClean="0"/>
+              <a:t>Predictor Algorithm</a:t>
+            </a:r>
+            <a:endParaRPr lang="en-US" dirty="0"/>
+          </a:p>
+        </p:txBody>
+      </p:sp>
+      <p:graphicFrame>
+        <p:nvGraphicFramePr>
+          <p:cNvPr id="4" name="Content Placeholder 3"/>
+          <p:cNvGraphicFramePr>
+            <a:graphicFrameLocks noGrp="1" noChangeAspect="1"/>
+          </p:cNvGraphicFramePr>
+          <p:nvPr>
+            <p:ph idx="1"/>
+            <p:extLst>
+              <p:ext uri="{D42A27DB-BD31-4B8C-83A1-F6EECF244321}">
+                <p14:modId xmlns:p14="http://schemas.microsoft.com/office/powerpoint/2010/main" val="4107889031"/>
+              </p:ext>
+            </p:extLst>
+          </p:nvPr>
+        </p:nvGraphicFramePr>
+        <p:xfrm>
+          <a:off x="2824163" y="1544638"/>
+          <a:ext cx="3482975" cy="4954587"/>
+        </p:xfrm>
+        <a:graphic>
+          <a:graphicData uri="http://schemas.openxmlformats.org/presentationml/2006/ole">
+            <mc:AlternateContent xmlns:mc="http://schemas.openxmlformats.org/markup-compatibility/2006">
+              <mc:Choice xmlns:v="urn:schemas-microsoft-com:vml" Requires="v">
+                <p:oleObj spid="_x0000_s1042" name="Equation" r:id="rId3" imgW="3187700" imgH="4533900" progId="Equation.3">
+                  <p:embed/>
+                </p:oleObj>
+              </mc:Choice>
+              <mc:Fallback>
+                <p:oleObj name="Equation" r:id="rId3" imgW="3187700" imgH="4533900" progId="Equation.3">
+                  <p:embed/>
+                  <p:pic>
+                    <p:nvPicPr>
+                      <p:cNvPr id="0" name=""/>
+                      <p:cNvPicPr/>
+                      <p:nvPr/>
+                    </p:nvPicPr>
+                    <p:blipFill>
+                      <a:blip r:embed="rId4"/>
+                      <a:stretch>
+                        <a:fillRect/>
+                      </a:stretch>
+                    </p:blipFill>
+                    <p:spPr>
+                      <a:xfrm>
+                        <a:off x="2824163" y="1544638"/>
+                        <a:ext cx="3482975" cy="4954587"/>
+                      </a:xfrm>
+                      <a:prstGeom prst="rect">
+                        <a:avLst/>
+                      </a:prstGeom>
+                      <a:solidFill>
+                        <a:schemeClr val="bg1"/>
+                      </a:solidFill>
+                      <a:ln>
+                        <a:noFill/>
+                      </a:ln>
+                    </p:spPr>
+                  </p:pic>
+                </p:oleObj>
+              </mc:Fallback>
+            </mc:AlternateContent>
+          </a:graphicData>
+        </a:graphic>
+      </p:graphicFrame>
+    </p:spTree>
+    <p:extLst>
+      <p:ext uri="{BB962C8B-B14F-4D97-AF65-F5344CB8AC3E}">
+        <p14:creationId xmlns:p14="http://schemas.microsoft.com/office/powerpoint/2010/main" val="3912528195"/>
+      </p:ext>
+    </p:extLst>
+  </p:cSld>
+  <p:clrMapOvr>
+    <a:masterClrMapping/>
+  </p:clrMapOvr>
+  <p:timing>
+    <p:tnLst>
+      <p:par>
+        <p:cTn xmlns:p14="http://schemas.microsoft.com/office/powerpoint/2010/main" id="1" dur="indefinite" restart="never" nodeType="tmRoot"/>
+      </p:par>
+    </p:tnLst>
+  </p:timing>
+</p:sld>
+</file>
+
+<file path=ppt/slides/slide29.xml><?xml version="1.0" encoding="utf-8"?>
+<p:sld xmlns:a="http://schemas.openxmlformats.org/drawingml/2006/main" xmlns:r="http://schemas.openxmlformats.org/officeDocument/2006/relationships" xmlns:p="http://schemas.openxmlformats.org/presentationml/2006/main">
+  <p:cSld>
+    <p:spTree>
+      <p:nvGrpSpPr>
+        <p:cNvPr id="1" name=""/>
+        <p:cNvGrpSpPr/>
+        <p:nvPr/>
+      </p:nvGrpSpPr>
+      <p:grpSpPr>
+        <a:xfrm>
+          <a:off x="0" y="0"/>
+          <a:ext cx="0" cy="0"/>
+          <a:chOff x="0" y="0"/>
+          <a:chExt cx="0" cy="0"/>
+        </a:xfrm>
+      </p:grpSpPr>
+      <p:sp>
+        <p:nvSpPr>
+          <p:cNvPr id="2" name="Title 1"/>
+          <p:cNvSpPr>
+            <a:spLocks noGrp="1"/>
+          </p:cNvSpPr>
+          <p:nvPr>
+            <p:ph type="title"/>
+          </p:nvPr>
+        </p:nvSpPr>
+        <p:spPr/>
+        <p:txBody>
+          <a:bodyPr/>
+          <a:lstStyle/>
+          <a:p>
+            <a:r>
+              <a:rPr lang="en-US" dirty="0" smtClean="0"/>
+              <a:t>Evaluation metrics</a:t>
+            </a:r>
+            <a:endParaRPr lang="en-US" dirty="0"/>
+          </a:p>
+        </p:txBody>
+      </p:sp>
+      <p:graphicFrame>
+        <p:nvGraphicFramePr>
+          <p:cNvPr id="4" name="Object 3"/>
+          <p:cNvGraphicFramePr>
+            <a:graphicFrameLocks noChangeAspect="1"/>
+          </p:cNvGraphicFramePr>
+          <p:nvPr>
+            <p:extLst>
+              <p:ext uri="{D42A27DB-BD31-4B8C-83A1-F6EECF244321}">
+                <p14:modId xmlns:p14="http://schemas.microsoft.com/office/powerpoint/2010/main" val="687660322"/>
+              </p:ext>
+            </p:extLst>
+          </p:nvPr>
+        </p:nvGraphicFramePr>
+        <p:xfrm>
+          <a:off x="2306569" y="2067123"/>
+          <a:ext cx="4210280" cy="3279587"/>
+        </p:xfrm>
+        <a:graphic>
+          <a:graphicData uri="http://schemas.openxmlformats.org/presentationml/2006/ole">
+            <mc:AlternateContent xmlns:mc="http://schemas.openxmlformats.org/markup-compatibility/2006">
+              <mc:Choice xmlns:v="urn:schemas-microsoft-com:vml" Requires="v">
+                <p:oleObj spid="_x0000_s2050" name="Equation" r:id="rId3" imgW="1206500" imgH="939800" progId="Equation.3">
+                  <p:embed/>
+                </p:oleObj>
+              </mc:Choice>
+              <mc:Fallback>
+                <p:oleObj name="Equation" r:id="rId3" imgW="1206500" imgH="939800" progId="Equation.3">
+                  <p:embed/>
+                  <p:pic>
+                    <p:nvPicPr>
+                      <p:cNvPr id="0" name=""/>
+                      <p:cNvPicPr/>
+                      <p:nvPr/>
+                    </p:nvPicPr>
+                    <p:blipFill>
+                      <a:blip r:embed="rId4"/>
+                      <a:stretch>
+                        <a:fillRect/>
+                      </a:stretch>
+                    </p:blipFill>
+                    <p:spPr>
+                      <a:xfrm>
+                        <a:off x="2306569" y="2067123"/>
+                        <a:ext cx="4210280" cy="3279587"/>
+                      </a:xfrm>
+                      <a:prstGeom prst="rect">
+                        <a:avLst/>
+                      </a:prstGeom>
+                      <a:solidFill>
+                        <a:schemeClr val="bg1"/>
+                      </a:solidFill>
+                    </p:spPr>
+                  </p:pic>
+                </p:oleObj>
+              </mc:Fallback>
+            </mc:AlternateContent>
+          </a:graphicData>
+        </a:graphic>
+      </p:graphicFrame>
+    </p:spTree>
+    <p:extLst>
+      <p:ext uri="{BB962C8B-B14F-4D97-AF65-F5344CB8AC3E}">
+        <p14:creationId xmlns:p14="http://schemas.microsoft.com/office/powerpoint/2010/main" val="2042949283"/>
+      </p:ext>
+    </p:extLst>
+  </p:cSld>
+  <p:clrMapOvr>
+    <a:masterClrMapping/>
+  </p:clrMapOvr>
+  <mc:AlternateContent xmlns:mc="http://schemas.openxmlformats.org/markup-compatibility/2006" xmlns:p14="http://schemas.microsoft.com/office/powerpoint/2010/main">
+    <mc:Choice Requires="p14">
+      <p:transition spd="slow" p14:dur="2000"/>
+    </mc:Choice>
+    <mc:Fallback xmlns="">
+      <p:transition xmlns:p14="http://schemas.microsoft.com/office/powerpoint/2010/main" spd="slow"/>
+    </mc:Fallback>
+  </mc:AlternateContent>
+  <p:timing>
+    <p:tnLst>
+      <p:par>
+        <p:cTn xmlns:p14="http://schemas.microsoft.com/office/powerpoint/2010/main" id="1" dur="indefinite" restart="never" nodeType="tmRoot"/>
+      </p:par>
+    </p:tnLst>
+  </p:timing>
 </p:sld>
 </file>
 
@@ -18327,12 +19302,6 @@
           <a:p>
             <a:r>
               <a:rPr lang="en-US" sz="2400" dirty="0" smtClean="0"/>
-              <a:t>Percentage of failures due to failure of hardware components:</a:t>
-            </a:r>
-          </a:p>
-          <a:p>
-            <a:r>
-              <a:rPr lang="en-US" sz="2400" dirty="0" smtClean="0"/>
               <a:t>Hardware failures difficult to heal</a:t>
             </a:r>
           </a:p>
@@ -18382,6 +19351,197 @@
       <p:transition xmlns:p14="http://schemas.microsoft.com/office/powerpoint/2010/main" spd="slow"/>
     </mc:Fallback>
   </mc:AlternateContent>
+  <p:timing>
+    <p:tnLst>
+      <p:par>
+        <p:cTn xmlns:p14="http://schemas.microsoft.com/office/powerpoint/2010/main" id="1" dur="indefinite" restart="never" nodeType="tmRoot"/>
+      </p:par>
+    </p:tnLst>
+  </p:timing>
+</p:sld>
+</file>
+
+<file path=ppt/slides/slide30.xml><?xml version="1.0" encoding="utf-8"?>
+<p:sld xmlns:a="http://schemas.openxmlformats.org/drawingml/2006/main" xmlns:r="http://schemas.openxmlformats.org/officeDocument/2006/relationships" xmlns:p="http://schemas.openxmlformats.org/presentationml/2006/main">
+  <p:cSld>
+    <p:spTree>
+      <p:nvGrpSpPr>
+        <p:cNvPr id="1" name=""/>
+        <p:cNvGrpSpPr/>
+        <p:nvPr/>
+      </p:nvGrpSpPr>
+      <p:grpSpPr>
+        <a:xfrm>
+          <a:off x="0" y="0"/>
+          <a:ext cx="0" cy="0"/>
+          <a:chOff x="0" y="0"/>
+          <a:chExt cx="0" cy="0"/>
+        </a:xfrm>
+      </p:grpSpPr>
+      <p:sp>
+        <p:nvSpPr>
+          <p:cNvPr id="2" name="Title 1"/>
+          <p:cNvSpPr>
+            <a:spLocks noGrp="1"/>
+          </p:cNvSpPr>
+          <p:nvPr>
+            <p:ph type="title"/>
+          </p:nvPr>
+        </p:nvSpPr>
+        <p:spPr/>
+        <p:txBody>
+          <a:bodyPr/>
+          <a:lstStyle/>
+          <a:p>
+            <a:r>
+              <a:rPr lang="en-US" dirty="0" smtClean="0"/>
+              <a:t>Results</a:t>
+            </a:r>
+            <a:endParaRPr lang="en-US" dirty="0"/>
+          </a:p>
+        </p:txBody>
+      </p:sp>
+      <p:sp>
+        <p:nvSpPr>
+          <p:cNvPr id="3" name="Content Placeholder 2"/>
+          <p:cNvSpPr>
+            <a:spLocks noGrp="1"/>
+          </p:cNvSpPr>
+          <p:nvPr>
+            <p:ph idx="1"/>
+          </p:nvPr>
+        </p:nvSpPr>
+        <p:spPr/>
+        <p:txBody>
+          <a:bodyPr/>
+          <a:lstStyle/>
+          <a:p>
+            <a:r>
+              <a:rPr lang="en-US" dirty="0" smtClean="0"/>
+              <a:t>Graphs – precision, recall, comparison of actual </a:t>
+            </a:r>
+            <a:r>
+              <a:rPr lang="en-US" dirty="0" err="1" smtClean="0"/>
+              <a:t>Vs</a:t>
+            </a:r>
+            <a:r>
+              <a:rPr lang="en-US" dirty="0" smtClean="0"/>
+              <a:t> </a:t>
+            </a:r>
+            <a:r>
+              <a:rPr lang="en-US" smtClean="0"/>
+              <a:t>predicted failures</a:t>
+            </a:r>
+            <a:endParaRPr lang="en-US" dirty="0"/>
+          </a:p>
+        </p:txBody>
+      </p:sp>
+    </p:spTree>
+    <p:extLst>
+      <p:ext uri="{BB962C8B-B14F-4D97-AF65-F5344CB8AC3E}">
+        <p14:creationId xmlns:p14="http://schemas.microsoft.com/office/powerpoint/2010/main" val="1358400907"/>
+      </p:ext>
+    </p:extLst>
+  </p:cSld>
+  <p:clrMapOvr>
+    <a:masterClrMapping/>
+  </p:clrMapOvr>
+  <mc:AlternateContent xmlns:mc="http://schemas.openxmlformats.org/markup-compatibility/2006" xmlns:p14="http://schemas.microsoft.com/office/powerpoint/2010/main">
+    <mc:Choice Requires="p14">
+      <p:transition spd="slow" p14:dur="2000"/>
+    </mc:Choice>
+    <mc:Fallback xmlns="">
+      <p:transition xmlns:p14="http://schemas.microsoft.com/office/powerpoint/2010/main" spd="slow"/>
+    </mc:Fallback>
+  </mc:AlternateContent>
+  <p:timing>
+    <p:tnLst>
+      <p:par>
+        <p:cTn xmlns:p14="http://schemas.microsoft.com/office/powerpoint/2010/main" id="1" dur="indefinite" restart="never" nodeType="tmRoot"/>
+      </p:par>
+    </p:tnLst>
+  </p:timing>
+</p:sld>
+</file>
+
+<file path=ppt/slides/slide31.xml><?xml version="1.0" encoding="utf-8"?>
+<p:sld xmlns:a="http://schemas.openxmlformats.org/drawingml/2006/main" xmlns:r="http://schemas.openxmlformats.org/officeDocument/2006/relationships" xmlns:p="http://schemas.openxmlformats.org/presentationml/2006/main">
+  <p:cSld>
+    <p:spTree>
+      <p:nvGrpSpPr>
+        <p:cNvPr id="1" name=""/>
+        <p:cNvGrpSpPr/>
+        <p:nvPr/>
+      </p:nvGrpSpPr>
+      <p:grpSpPr>
+        <a:xfrm>
+          <a:off x="0" y="0"/>
+          <a:ext cx="0" cy="0"/>
+          <a:chOff x="0" y="0"/>
+          <a:chExt cx="0" cy="0"/>
+        </a:xfrm>
+      </p:grpSpPr>
+      <p:sp>
+        <p:nvSpPr>
+          <p:cNvPr id="2" name="Title 1"/>
+          <p:cNvSpPr>
+            <a:spLocks noGrp="1"/>
+          </p:cNvSpPr>
+          <p:nvPr>
+            <p:ph type="title"/>
+          </p:nvPr>
+        </p:nvSpPr>
+        <p:spPr/>
+        <p:txBody>
+          <a:bodyPr/>
+          <a:lstStyle/>
+          <a:p>
+            <a:r>
+              <a:rPr lang="en-US" dirty="0" smtClean="0"/>
+              <a:t>Results – Precision and Accuracy</a:t>
+            </a:r>
+            <a:endParaRPr lang="en-US" dirty="0"/>
+          </a:p>
+        </p:txBody>
+      </p:sp>
+      <p:pic>
+        <p:nvPicPr>
+          <p:cNvPr id="4" name="Content Placeholder 3" descr="accuracy_0.4(weekly).eps"/>
+          <p:cNvPicPr>
+            <a:picLocks noGrp="1" noChangeAspect="1"/>
+          </p:cNvPicPr>
+          <p:nvPr>
+            <p:ph idx="1"/>
+          </p:nvPr>
+        </p:nvPicPr>
+        <p:blipFill rotWithShape="1">
+          <a:blip r:embed="rId2">
+            <a:extLst>
+              <a:ext uri="{28A0092B-C50C-407E-A947-70E740481C1C}">
+                <a14:useLocalDpi xmlns:a14="http://schemas.microsoft.com/office/drawing/2010/main" val="0"/>
+              </a:ext>
+            </a:extLst>
+          </a:blip>
+          <a:srcRect t="-2382" r="16568" b="-2382"/>
+          <a:stretch/>
+        </p:blipFill>
+        <p:spPr>
+          <a:xfrm>
+            <a:off x="991147" y="1425388"/>
+            <a:ext cx="7220600" cy="4803324"/>
+          </a:xfrm>
+        </p:spPr>
+      </p:pic>
+    </p:spTree>
+    <p:extLst>
+      <p:ext uri="{BB962C8B-B14F-4D97-AF65-F5344CB8AC3E}">
+        <p14:creationId xmlns:p14="http://schemas.microsoft.com/office/powerpoint/2010/main" val="3805585582"/>
+      </p:ext>
+    </p:extLst>
+  </p:cSld>
+  <p:clrMapOvr>
+    <a:masterClrMapping/>
+  </p:clrMapOvr>
   <p:timing>
     <p:tnLst>
       <p:par>

</xml_diff>